<commit_message>
working on L6.1-6.3 (or 6.4)
</commit_message>
<xml_diff>
--- a/Slides/Lesson 6.3 ormap, andmap, and filter.pptx
+++ b/Slides/Lesson 6.3 ormap, andmap, and filter.pptx
@@ -5664,23 +5664,7 @@
                   <a:schemeClr val="bg1"/>
                 </a:solidFill>
               </a:rPr>
-              <a:t>(X -&gt; Bool) </a:t>
-            </a:r>
-            <a:r>
-              <a:rPr lang="en-US" dirty="0" err="1">
-                <a:solidFill>
-                  <a:schemeClr val="bg1"/>
-                </a:solidFill>
-              </a:rPr>
-              <a:t>ListOfX</a:t>
-            </a:r>
-            <a:r>
-              <a:rPr lang="en-US" dirty="0">
-                <a:solidFill>
-                  <a:schemeClr val="bg1"/>
-                </a:solidFill>
-              </a:rPr>
-              <a:t> </a:t>
+              <a:t>(X -&gt; Bool) XList </a:t>
             </a:r>
             <a:r>
               <a:rPr lang="en-US" dirty="0"/>
@@ -6007,23 +5991,7 @@
                   <a:schemeClr val="bg1"/>
                 </a:solidFill>
               </a:rPr>
-              <a:t>(X -&gt; Bool) </a:t>
-            </a:r>
-            <a:r>
-              <a:rPr lang="en-US" dirty="0" err="1">
-                <a:solidFill>
-                  <a:schemeClr val="bg1"/>
-                </a:solidFill>
-              </a:rPr>
-              <a:t>ListOfX</a:t>
-            </a:r>
-            <a:r>
-              <a:rPr lang="en-US" dirty="0">
-                <a:solidFill>
-                  <a:schemeClr val="bg1"/>
-                </a:solidFill>
-              </a:rPr>
-              <a:t> </a:t>
+              <a:t>(X -&gt; Bool) XList </a:t>
             </a:r>
             <a:r>
               <a:rPr lang="en-US" dirty="0"/>
@@ -6334,15 +6302,7 @@
             </a:r>
             <a:r>
               <a:rPr lang="en-US" dirty="0"/>
-              <a:t> : (X -&gt; Bool) </a:t>
-            </a:r>
-            <a:r>
-              <a:rPr lang="en-US" dirty="0" err="1"/>
-              <a:t>ListOfX</a:t>
-            </a:r>
-            <a:r>
-              <a:rPr lang="en-US" dirty="0"/>
-              <a:t> -&gt; Bool</a:t>
+              <a:t> : (X -&gt; Bool) XList -&gt; Bool</a:t>
             </a:r>
           </a:p>
           <a:p>
@@ -6991,14 +6951,14 @@
               <a:p>
                 <a:pPr algn="ctr"/>
                 <a:r>
-                  <a:rPr lang="en-US" b="1" dirty="0" err="1">
+                  <a:rPr lang="en-US" b="1" dirty="0">
                     <a:solidFill>
                       <a:schemeClr val="tx1"/>
                     </a:solidFill>
                     <a:latin typeface="Consolas" pitchFamily="49" charset="0"/>
                     <a:cs typeface="Consolas" pitchFamily="49" charset="0"/>
                   </a:rPr>
-                  <a:t>ListOfX</a:t>
+                  <a:t>XList</a:t>
                 </a:r>
                 <a:endParaRPr lang="en-US" dirty="0">
                   <a:solidFill>
@@ -7623,15 +7583,7 @@
             </a:r>
             <a:r>
               <a:rPr lang="en-US" dirty="0"/>
-              <a:t> must be a </a:t>
-            </a:r>
-            <a:r>
-              <a:rPr lang="en-US" dirty="0" err="1"/>
-              <a:t>ListOfX</a:t>
-            </a:r>
-            <a:r>
-              <a:rPr lang="en-US" dirty="0"/>
-              <a:t>.  We write all this down in the contract.</a:t>
+              <a:t> must be a XList.  We write all this down in the contract.</a:t>
             </a:r>
           </a:p>
         </p:txBody>
@@ -8431,21 +8383,30 @@
                 <a:latin typeface="Consolas" pitchFamily="49" charset="0"/>
                 <a:cs typeface="Consolas" pitchFamily="49" charset="0"/>
               </a:rPr>
-              <a:t> : (X -&gt; Boolean) </a:t>
+              <a:t> : (X -&gt; Boolean) XList -&gt; Boolean </a:t>
+            </a:r>
+          </a:p>
+          <a:p>
+            <a:r>
+              <a:rPr lang="en-US" sz="2000" b="1" dirty="0">
+                <a:latin typeface="Consolas" pitchFamily="49" charset="0"/>
+                <a:cs typeface="Consolas" pitchFamily="49" charset="0"/>
+              </a:rPr>
+              <a:t>;; GIVEN: A predicate p on X's and a list of X's, </a:t>
             </a:r>
             <a:r>
               <a:rPr lang="en-US" sz="2000" b="1" dirty="0" err="1">
                 <a:latin typeface="Consolas" pitchFamily="49" charset="0"/>
                 <a:cs typeface="Consolas" pitchFamily="49" charset="0"/>
               </a:rPr>
-              <a:t>ListOfX</a:t>
+              <a:t>lst</a:t>
             </a:r>
             <a:r>
               <a:rPr lang="en-US" sz="2000" b="1" dirty="0">
                 <a:latin typeface="Consolas" pitchFamily="49" charset="0"/>
                 <a:cs typeface="Consolas" pitchFamily="49" charset="0"/>
               </a:rPr>
-              <a:t> -&gt; Boolean </a:t>
+              <a:t> </a:t>
             </a:r>
           </a:p>
           <a:p>
@@ -8454,30 +8415,35 @@
                 <a:latin typeface="Consolas" pitchFamily="49" charset="0"/>
                 <a:cs typeface="Consolas" pitchFamily="49" charset="0"/>
               </a:rPr>
-              <a:t>;; GIVEN: A predicate p on X's and a list of X's, lox </a:t>
-            </a:r>
-          </a:p>
-          <a:p>
+              <a:t>;; RETURNS: true </a:t>
+            </a:r>
+            <a:r>
+              <a:rPr lang="en-US" sz="2000" b="1" dirty="0" err="1">
+                <a:latin typeface="Consolas" pitchFamily="49" charset="0"/>
+                <a:cs typeface="Consolas" pitchFamily="49" charset="0"/>
+              </a:rPr>
+              <a:t>iff</a:t>
+            </a:r>
             <a:r>
               <a:rPr lang="en-US" sz="2000" b="1" dirty="0">
                 <a:latin typeface="Consolas" pitchFamily="49" charset="0"/>
                 <a:cs typeface="Consolas" pitchFamily="49" charset="0"/>
               </a:rPr>
-              <a:t>;; RETURNS: true </a:t>
+              <a:t> p holds for at least one value in </a:t>
             </a:r>
             <a:r>
               <a:rPr lang="en-US" sz="2000" b="1" dirty="0" err="1">
                 <a:latin typeface="Consolas" pitchFamily="49" charset="0"/>
                 <a:cs typeface="Consolas" pitchFamily="49" charset="0"/>
               </a:rPr>
-              <a:t>iff</a:t>
+              <a:t>lst</a:t>
             </a:r>
             <a:r>
               <a:rPr lang="en-US" sz="2000" b="1" dirty="0">
                 <a:latin typeface="Consolas" pitchFamily="49" charset="0"/>
                 <a:cs typeface="Consolas" pitchFamily="49" charset="0"/>
               </a:rPr>
-              <a:t> p holds for at least one value in lox </a:t>
+              <a:t> </a:t>
             </a:r>
           </a:p>
           <a:p>
@@ -8560,7 +8526,21 @@
                 <a:latin typeface="Consolas" pitchFamily="49" charset="0"/>
                 <a:cs typeface="Consolas" pitchFamily="49" charset="0"/>
               </a:rPr>
-              <a:t> p lox) ...) </a:t>
+              <a:t> p </a:t>
+            </a:r>
+            <a:r>
+              <a:rPr lang="en-US" sz="2000" b="1" dirty="0" err="1">
+                <a:latin typeface="Consolas" pitchFamily="49" charset="0"/>
+                <a:cs typeface="Consolas" pitchFamily="49" charset="0"/>
+              </a:rPr>
+              <a:t>lst</a:t>
+            </a:r>
+            <a:r>
+              <a:rPr lang="en-US" sz="2000" b="1" dirty="0">
+                <a:latin typeface="Consolas" pitchFamily="49" charset="0"/>
+                <a:cs typeface="Consolas" pitchFamily="49" charset="0"/>
+              </a:rPr>
+              <a:t>) ...) </a:t>
             </a:r>
           </a:p>
         </p:txBody>
@@ -8901,15 +8881,7 @@
             </a:r>
             <a:r>
               <a:rPr lang="en-US" sz="2400" dirty="0"/>
-              <a:t> : (X -&gt; Bool) </a:t>
-            </a:r>
-            <a:r>
-              <a:rPr lang="en-US" sz="2400" dirty="0" err="1"/>
-              <a:t>ListOfX</a:t>
-            </a:r>
-            <a:r>
-              <a:rPr lang="en-US" sz="2400" dirty="0"/>
-              <a:t> -&gt; Bool</a:t>
+              <a:t> : (X -&gt; Bool) XList -&gt; Bool</a:t>
             </a:r>
           </a:p>
           <a:p>
@@ -8921,7 +8893,15 @@
           <a:p>
             <a:r>
               <a:rPr lang="en-US" sz="2400" dirty="0"/>
-              <a:t>;; and a list of X's, lox </a:t>
+              <a:t>;; and a list of X's, </a:t>
+            </a:r>
+            <a:r>
+              <a:rPr lang="en-US" sz="2400" dirty="0" err="1"/>
+              <a:t>lst</a:t>
+            </a:r>
+            <a:r>
+              <a:rPr lang="en-US" sz="2400" dirty="0"/>
+              <a:t> </a:t>
             </a:r>
           </a:p>
           <a:p>
@@ -8941,7 +8921,15 @@
           <a:p>
             <a:r>
               <a:rPr lang="en-US" sz="2400" dirty="0"/>
-              <a:t>;; in lox </a:t>
+              <a:t>;; in </a:t>
+            </a:r>
+            <a:r>
+              <a:rPr lang="en-US" sz="2400" dirty="0" err="1"/>
+              <a:t>lst</a:t>
+            </a:r>
+            <a:r>
+              <a:rPr lang="en-US" sz="2400" dirty="0"/>
+              <a:t> </a:t>
             </a:r>
           </a:p>
           <a:p>
@@ -9249,7 +9237,7 @@
             </a:r>
             <a:r>
               <a:rPr lang="en-US" dirty="0" err="1"/>
-              <a:t>ListOfInteger</a:t>
+              <a:t>IntegerList</a:t>
             </a:r>
             <a:r>
               <a:rPr lang="en-US" dirty="0"/>
@@ -9257,7 +9245,7 @@
             </a:r>
             <a:r>
               <a:rPr lang="en-US" dirty="0" err="1"/>
-              <a:t>ListOfInteger</a:t>
+              <a:t>IntegerList</a:t>
             </a:r>
             <a:endParaRPr lang="en-US" dirty="0"/>
           </a:p>
@@ -9280,7 +9268,7 @@
             </a:r>
             <a:r>
               <a:rPr lang="en-US" dirty="0" err="1"/>
-              <a:t>ListOfInteger</a:t>
+              <a:t>IntegerList</a:t>
             </a:r>
             <a:r>
               <a:rPr lang="en-US" dirty="0"/>
@@ -9502,24 +9490,14 @@
           <a:p>
             <a:r>
               <a:rPr lang="en-US" dirty="0"/>
-              <a:t>;; filter : (X -&gt; Boolean) </a:t>
-            </a:r>
-            <a:r>
-              <a:rPr lang="en-US" dirty="0" err="1"/>
-              <a:t>ListOfX</a:t>
-            </a:r>
-            <a:endParaRPr lang="en-US" dirty="0"/>
-          </a:p>
-          <a:p>
-            <a:r>
-              <a:rPr lang="en-US" dirty="0"/>
-              <a:t>;;            -&gt; </a:t>
-            </a:r>
-            <a:r>
-              <a:rPr lang="en-US" dirty="0" err="1"/>
-              <a:t>ListOfX</a:t>
-            </a:r>
-            <a:endParaRPr lang="en-US" dirty="0"/>
+              <a:t>;; filter : (X -&gt; Boolean) XList</a:t>
+            </a:r>
+          </a:p>
+          <a:p>
+            <a:r>
+              <a:rPr lang="en-US" dirty="0"/>
+              <a:t>;;            -&gt; XList</a:t>
+            </a:r>
           </a:p>
           <a:p>
             <a:r>
@@ -9536,15 +9514,7 @@
           <a:p>
             <a:r>
               <a:rPr lang="en-US" dirty="0"/>
-              <a:t>;; STRATEGY: Use template for </a:t>
-            </a:r>
-            <a:r>
-              <a:rPr lang="en-US" dirty="0" err="1"/>
-              <a:t>ListOfX</a:t>
-            </a:r>
-            <a:r>
-              <a:rPr lang="en-US" dirty="0"/>
-              <a:t> on </a:t>
+              <a:t>;; STRATEGY: Use template for XList on </a:t>
             </a:r>
             <a:r>
               <a:rPr lang="en-US" dirty="0" err="1"/>
@@ -9731,18 +9701,13 @@
             <a:avLst/>
           </a:prstGeom>
           <a:solidFill>
-            <a:schemeClr val="accent3">
+            <a:schemeClr val="accent1">
               <a:lumMod val="20000"/>
               <a:lumOff val="80000"/>
             </a:schemeClr>
           </a:solidFill>
           <a:ln w="12700">
-            <a:solidFill>
-              <a:schemeClr val="tx2">
-                <a:lumMod val="60000"/>
-                <a:lumOff val="40000"/>
-              </a:schemeClr>
-            </a:solidFill>
+            <a:noFill/>
           </a:ln>
         </p:spPr>
         <p:txBody>
@@ -9844,7 +9809,7 @@
             </a:r>
             <a:r>
               <a:rPr lang="en-US" dirty="0" err="1"/>
-              <a:t>ListOfInteger</a:t>
+              <a:t>IntegerList</a:t>
             </a:r>
             <a:r>
               <a:rPr lang="en-US" dirty="0"/>
@@ -9852,7 +9817,7 @@
             </a:r>
             <a:r>
               <a:rPr lang="en-US" dirty="0" err="1"/>
-              <a:t>ListOfInteger</a:t>
+              <a:t>IntegerList</a:t>
             </a:r>
             <a:endParaRPr lang="en-US" dirty="0"/>
           </a:p>
@@ -10002,18 +9967,13 @@
             <a:avLst/>
           </a:prstGeom>
           <a:solidFill>
-            <a:schemeClr val="accent3">
+            <a:schemeClr val="accent1">
               <a:lumMod val="20000"/>
               <a:lumOff val="80000"/>
             </a:schemeClr>
           </a:solidFill>
           <a:ln w="12700">
-            <a:solidFill>
-              <a:schemeClr val="tx2">
-                <a:lumMod val="60000"/>
-                <a:lumOff val="40000"/>
-              </a:schemeClr>
-            </a:solidFill>
+            <a:noFill/>
           </a:ln>
         </p:spPr>
         <p:txBody>
@@ -10230,12 +10190,14 @@
             <a:avLst/>
           </a:prstGeom>
           <a:solidFill>
-            <a:schemeClr val="accent3">
-              <a:lumMod val="40000"/>
-              <a:lumOff val="60000"/>
+            <a:schemeClr val="accent1">
+              <a:lumMod val="20000"/>
+              <a:lumOff val="80000"/>
             </a:schemeClr>
           </a:solidFill>
-          <a:ln/>
+          <a:ln>
+            <a:noFill/>
+          </a:ln>
         </p:spPr>
         <p:style>
           <a:lnRef idx="2">
@@ -10627,12 +10589,8 @@
           <a:lstStyle/>
           <a:p>
             <a:r>
-              <a:rPr lang="en-US"/>
-              <a:t>Study 05-3-map.rkt in </a:t>
-            </a:r>
-            <a:r>
-              <a:rPr lang="en-US" dirty="0"/>
-              <a:t>the examples folder.</a:t>
+              <a:rPr lang="en-US" dirty="0"/>
+              <a:t>Study 06-2-1-map.rkt in the examples folder.</a:t>
             </a:r>
           </a:p>
           <a:p>
@@ -10644,7 +10602,7 @@
           <a:p>
             <a:r>
               <a:rPr lang="en-US" dirty="0"/>
-              <a:t>Do Guided Practice 5.3</a:t>
+              <a:t>Do Guided Practice 6.3</a:t>
             </a:r>
           </a:p>
           <a:p>
@@ -10964,7 +10922,7 @@
                 <a:latin typeface="Consolas" pitchFamily="49" charset="0"/>
                 <a:cs typeface="Consolas" pitchFamily="49" charset="0"/>
               </a:rPr>
-              <a:t>ListOfString</a:t>
+              <a:t>StringList</a:t>
             </a:r>
             <a:r>
               <a:rPr lang="en-US" sz="2000" b="1" dirty="0">
@@ -11008,7 +10966,7 @@
                 <a:latin typeface="Consolas" pitchFamily="49" charset="0"/>
                 <a:cs typeface="Consolas" pitchFamily="49" charset="0"/>
               </a:rPr>
-              <a:t>ListOfString</a:t>
+              <a:t>StringList</a:t>
             </a:r>
             <a:r>
               <a:rPr lang="en-US" sz="2000" b="1" dirty="0">
@@ -11022,7 +10980,7 @@
                 <a:latin typeface="Consolas" pitchFamily="49" charset="0"/>
                 <a:cs typeface="Consolas" pitchFamily="49" charset="0"/>
               </a:rPr>
-              <a:t>los</a:t>
+              <a:t>lst</a:t>
             </a:r>
             <a:endParaRPr lang="en-US" sz="2000" b="1" dirty="0">
               <a:latin typeface="Consolas" pitchFamily="49" charset="0"/>
@@ -11041,7 +10999,21 @@
                 <a:latin typeface="Consolas" pitchFamily="49" charset="0"/>
                 <a:cs typeface="Consolas" pitchFamily="49" charset="0"/>
               </a:rPr>
-              <a:t>(define (find-dog los)</a:t>
+              <a:t>(define (find-dog </a:t>
+            </a:r>
+            <a:r>
+              <a:rPr lang="en-US" sz="2000" b="1" dirty="0" err="1">
+                <a:latin typeface="Consolas" pitchFamily="49" charset="0"/>
+                <a:cs typeface="Consolas" pitchFamily="49" charset="0"/>
+              </a:rPr>
+              <a:t>lst</a:t>
+            </a:r>
+            <a:r>
+              <a:rPr lang="en-US" sz="2000" b="1" dirty="0">
+                <a:latin typeface="Consolas" pitchFamily="49" charset="0"/>
+                <a:cs typeface="Consolas" pitchFamily="49" charset="0"/>
+              </a:rPr>
+              <a:t>)</a:t>
             </a:r>
           </a:p>
           <a:p>
@@ -11082,7 +11054,21 @@
                 <a:latin typeface="Consolas" pitchFamily="49" charset="0"/>
                 <a:cs typeface="Consolas" pitchFamily="49" charset="0"/>
               </a:rPr>
-              <a:t>    [(empty? los) false]</a:t>
+              <a:t>    [(empty? </a:t>
+            </a:r>
+            <a:r>
+              <a:rPr lang="en-US" sz="2000" b="1" dirty="0" err="1">
+                <a:latin typeface="Consolas" pitchFamily="49" charset="0"/>
+                <a:cs typeface="Consolas" pitchFamily="49" charset="0"/>
+              </a:rPr>
+              <a:t>lst</a:t>
+            </a:r>
+            <a:r>
+              <a:rPr lang="en-US" sz="2000" b="1" dirty="0">
+                <a:latin typeface="Consolas" pitchFamily="49" charset="0"/>
+                <a:cs typeface="Consolas" pitchFamily="49" charset="0"/>
+              </a:rPr>
+              <a:t>) false]</a:t>
             </a:r>
           </a:p>
           <a:p>
@@ -11112,7 +11098,21 @@
                 <a:latin typeface="Consolas" pitchFamily="49" charset="0"/>
                 <a:cs typeface="Consolas" pitchFamily="49" charset="0"/>
               </a:rPr>
-              <a:t>           (string=? (first los) "dog")           </a:t>
+              <a:t>           (string=? (first </a:t>
+            </a:r>
+            <a:r>
+              <a:rPr lang="en-US" sz="2000" b="1" dirty="0" err="1">
+                <a:latin typeface="Consolas" pitchFamily="49" charset="0"/>
+                <a:cs typeface="Consolas" pitchFamily="49" charset="0"/>
+              </a:rPr>
+              <a:t>lst</a:t>
+            </a:r>
+            <a:r>
+              <a:rPr lang="en-US" sz="2000" b="1" dirty="0">
+                <a:latin typeface="Consolas" pitchFamily="49" charset="0"/>
+                <a:cs typeface="Consolas" pitchFamily="49" charset="0"/>
+              </a:rPr>
+              <a:t>) "dog")           </a:t>
             </a:r>
           </a:p>
           <a:p>
@@ -11127,7 +11127,21 @@
                 <a:latin typeface="Consolas" pitchFamily="49" charset="0"/>
                 <a:cs typeface="Consolas" pitchFamily="49" charset="0"/>
               </a:rPr>
-              <a:t>           (find-dog (rest los)))]))</a:t>
+              <a:t>           (find-dog (rest </a:t>
+            </a:r>
+            <a:r>
+              <a:rPr lang="en-US" sz="2000" b="1" dirty="0" err="1">
+                <a:latin typeface="Consolas" pitchFamily="49" charset="0"/>
+                <a:cs typeface="Consolas" pitchFamily="49" charset="0"/>
+              </a:rPr>
+              <a:t>lst</a:t>
+            </a:r>
+            <a:r>
+              <a:rPr lang="en-US" sz="2000" b="1" dirty="0">
+                <a:latin typeface="Consolas" pitchFamily="49" charset="0"/>
+                <a:cs typeface="Consolas" pitchFamily="49" charset="0"/>
+              </a:rPr>
+              <a:t>)))]))</a:t>
             </a:r>
           </a:p>
           <a:p>
@@ -11275,7 +11289,7 @@
             </a:r>
             <a:r>
               <a:rPr lang="en-US" dirty="0" err="1"/>
-              <a:t>ListOfInteger</a:t>
+              <a:t>IntegerList</a:t>
             </a:r>
             <a:r>
               <a:rPr lang="en-US" dirty="0"/>
@@ -11309,7 +11323,7 @@
             </a:r>
             <a:r>
               <a:rPr lang="en-US" dirty="0" err="1"/>
-              <a:t>ListOfInteger</a:t>
+              <a:t>IntegerList</a:t>
             </a:r>
             <a:r>
               <a:rPr lang="en-US" dirty="0"/>
@@ -11317,7 +11331,7 @@
             </a:r>
             <a:r>
               <a:rPr lang="en-US" dirty="0" err="1"/>
-              <a:t>los</a:t>
+              <a:t>lst</a:t>
             </a:r>
             <a:endParaRPr lang="en-US" dirty="0"/>
           </a:p>
@@ -11327,7 +11341,15 @@
           <a:p>
             <a:r>
               <a:rPr lang="en-US" dirty="0"/>
-              <a:t>(define (has-even? los)</a:t>
+              <a:t>(define (has-even? </a:t>
+            </a:r>
+            <a:r>
+              <a:rPr lang="en-US" dirty="0" err="1"/>
+              <a:t>lst</a:t>
+            </a:r>
+            <a:r>
+              <a:rPr lang="en-US" dirty="0"/>
+              <a:t>)</a:t>
             </a:r>
           </a:p>
           <a:p>
@@ -11344,7 +11366,15 @@
           <a:p>
             <a:r>
               <a:rPr lang="en-US" dirty="0"/>
-              <a:t>    [(empty? los) false]</a:t>
+              <a:t>    [(empty? </a:t>
+            </a:r>
+            <a:r>
+              <a:rPr lang="en-US" dirty="0" err="1"/>
+              <a:t>lst</a:t>
+            </a:r>
+            <a:r>
+              <a:rPr lang="en-US" dirty="0"/>
+              <a:t>) false]</a:t>
             </a:r>
           </a:p>
           <a:p>
@@ -11356,13 +11386,29 @@
           <a:p>
             <a:r>
               <a:rPr lang="en-US" dirty="0"/>
-              <a:t>           (even? (first los))</a:t>
-            </a:r>
-          </a:p>
-          <a:p>
-            <a:r>
-              <a:rPr lang="en-US" dirty="0"/>
-              <a:t>           (has-even? (rest los)))]))</a:t>
+              <a:t>           (even? (first </a:t>
+            </a:r>
+            <a:r>
+              <a:rPr lang="en-US" dirty="0" err="1"/>
+              <a:t>lst</a:t>
+            </a:r>
+            <a:r>
+              <a:rPr lang="en-US" dirty="0"/>
+              <a:t>))</a:t>
+            </a:r>
+          </a:p>
+          <a:p>
+            <a:r>
+              <a:rPr lang="en-US" dirty="0"/>
+              <a:t>           (has-even? (rest </a:t>
+            </a:r>
+            <a:r>
+              <a:rPr lang="en-US" dirty="0" err="1"/>
+              <a:t>lst</a:t>
+            </a:r>
+            <a:r>
+              <a:rPr lang="en-US" dirty="0"/>
+              <a:t>)))]))</a:t>
             </a:r>
           </a:p>
         </p:txBody>
@@ -11472,7 +11518,21 @@
                 <a:latin typeface="Consolas" pitchFamily="49" charset="0"/>
                 <a:cs typeface="Consolas" pitchFamily="49" charset="0"/>
               </a:rPr>
-              <a:t>(define (find-dog los)</a:t>
+              <a:t>(define (find-dog </a:t>
+            </a:r>
+            <a:r>
+              <a:rPr lang="en-US" sz="2400" b="1" dirty="0" err="1">
+                <a:latin typeface="Consolas" pitchFamily="49" charset="0"/>
+                <a:cs typeface="Consolas" pitchFamily="49" charset="0"/>
+              </a:rPr>
+              <a:t>lst</a:t>
+            </a:r>
+            <a:r>
+              <a:rPr lang="en-US" sz="2400" b="1" dirty="0">
+                <a:latin typeface="Consolas" pitchFamily="49" charset="0"/>
+                <a:cs typeface="Consolas" pitchFamily="49" charset="0"/>
+              </a:rPr>
+              <a:t>)</a:t>
             </a:r>
           </a:p>
           <a:p>
@@ -11507,7 +11567,21 @@
                 <a:latin typeface="Consolas" pitchFamily="49" charset="0"/>
                 <a:cs typeface="Consolas" pitchFamily="49" charset="0"/>
               </a:rPr>
-              <a:t>  [(empty? los) false]</a:t>
+              <a:t>  [(empty? </a:t>
+            </a:r>
+            <a:r>
+              <a:rPr lang="en-US" sz="2400" b="1" dirty="0" err="1">
+                <a:latin typeface="Consolas" pitchFamily="49" charset="0"/>
+                <a:cs typeface="Consolas" pitchFamily="49" charset="0"/>
+              </a:rPr>
+              <a:t>lst</a:t>
+            </a:r>
+            <a:r>
+              <a:rPr lang="en-US" sz="2400" b="1" dirty="0">
+                <a:latin typeface="Consolas" pitchFamily="49" charset="0"/>
+                <a:cs typeface="Consolas" pitchFamily="49" charset="0"/>
+              </a:rPr>
+              <a:t>) false]</a:t>
             </a:r>
           </a:p>
           <a:p>
@@ -11575,7 +11649,21 @@
                 <a:latin typeface="Consolas" pitchFamily="49" charset="0"/>
                 <a:cs typeface="Consolas" pitchFamily="49" charset="0"/>
               </a:rPr>
-              <a:t>(first los) </a:t>
+              <a:t>(first </a:t>
+            </a:r>
+            <a:r>
+              <a:rPr lang="en-US" sz="2400" b="1" dirty="0" err="1">
+                <a:latin typeface="Consolas" pitchFamily="49" charset="0"/>
+                <a:cs typeface="Consolas" pitchFamily="49" charset="0"/>
+              </a:rPr>
+              <a:t>lst</a:t>
+            </a:r>
+            <a:r>
+              <a:rPr lang="en-US" sz="2400" b="1" dirty="0">
+                <a:latin typeface="Consolas" pitchFamily="49" charset="0"/>
+                <a:cs typeface="Consolas" pitchFamily="49" charset="0"/>
+              </a:rPr>
+              <a:t>) </a:t>
             </a:r>
             <a:r>
               <a:rPr lang="en-US" sz="2400" b="1" dirty="0">
@@ -11616,7 +11704,21 @@
                 <a:latin typeface="Consolas" pitchFamily="49" charset="0"/>
                 <a:cs typeface="Consolas" pitchFamily="49" charset="0"/>
               </a:rPr>
-              <a:t>     (rest los)))]))</a:t>
+              <a:t>     (rest </a:t>
+            </a:r>
+            <a:r>
+              <a:rPr lang="en-US" sz="2400" b="1" dirty="0" err="1">
+                <a:latin typeface="Consolas" pitchFamily="49" charset="0"/>
+                <a:cs typeface="Consolas" pitchFamily="49" charset="0"/>
+              </a:rPr>
+              <a:t>lst</a:t>
+            </a:r>
+            <a:r>
+              <a:rPr lang="en-US" sz="2400" b="1" dirty="0">
+                <a:latin typeface="Consolas" pitchFamily="49" charset="0"/>
+                <a:cs typeface="Consolas" pitchFamily="49" charset="0"/>
+              </a:rPr>
+              <a:t>)))]))</a:t>
             </a:r>
           </a:p>
         </p:txBody>
@@ -11651,7 +11753,21 @@
                 <a:latin typeface="Consolas" pitchFamily="49" charset="0"/>
                 <a:cs typeface="Consolas" pitchFamily="49" charset="0"/>
               </a:rPr>
-              <a:t>(define (has-even? los)</a:t>
+              <a:t>(define (has-even? </a:t>
+            </a:r>
+            <a:r>
+              <a:rPr lang="en-US" sz="2400" b="1" dirty="0" err="1">
+                <a:latin typeface="Consolas" pitchFamily="49" charset="0"/>
+                <a:cs typeface="Consolas" pitchFamily="49" charset="0"/>
+              </a:rPr>
+              <a:t>lst</a:t>
+            </a:r>
+            <a:r>
+              <a:rPr lang="en-US" sz="2400" b="1" dirty="0">
+                <a:latin typeface="Consolas" pitchFamily="49" charset="0"/>
+                <a:cs typeface="Consolas" pitchFamily="49" charset="0"/>
+              </a:rPr>
+              <a:t>)</a:t>
             </a:r>
           </a:p>
           <a:p>
@@ -11686,7 +11802,21 @@
                 <a:latin typeface="Consolas" pitchFamily="49" charset="0"/>
                 <a:cs typeface="Consolas" pitchFamily="49" charset="0"/>
               </a:rPr>
-              <a:t>  [(empty? los) false]</a:t>
+              <a:t>  [(empty? </a:t>
+            </a:r>
+            <a:r>
+              <a:rPr lang="en-US" sz="2400" b="1" dirty="0" err="1">
+                <a:latin typeface="Consolas" pitchFamily="49" charset="0"/>
+                <a:cs typeface="Consolas" pitchFamily="49" charset="0"/>
+              </a:rPr>
+              <a:t>lst</a:t>
+            </a:r>
+            <a:r>
+              <a:rPr lang="en-US" sz="2400" b="1" dirty="0">
+                <a:latin typeface="Consolas" pitchFamily="49" charset="0"/>
+                <a:cs typeface="Consolas" pitchFamily="49" charset="0"/>
+              </a:rPr>
+              <a:t>) false]</a:t>
             </a:r>
           </a:p>
           <a:p>
@@ -11739,7 +11869,21 @@
                 <a:latin typeface="Consolas" pitchFamily="49" charset="0"/>
                 <a:cs typeface="Consolas" pitchFamily="49" charset="0"/>
               </a:rPr>
-              <a:t>(first los) </a:t>
+              <a:t>(first </a:t>
+            </a:r>
+            <a:r>
+              <a:rPr lang="en-US" sz="2400" b="1" dirty="0" err="1">
+                <a:latin typeface="Consolas" pitchFamily="49" charset="0"/>
+                <a:cs typeface="Consolas" pitchFamily="49" charset="0"/>
+              </a:rPr>
+              <a:t>lst</a:t>
+            </a:r>
+            <a:r>
+              <a:rPr lang="en-US" sz="2400" b="1" dirty="0">
+                <a:latin typeface="Consolas" pitchFamily="49" charset="0"/>
+                <a:cs typeface="Consolas" pitchFamily="49" charset="0"/>
+              </a:rPr>
+              <a:t>) </a:t>
             </a:r>
             <a:r>
               <a:rPr lang="en-US" sz="2400" b="1" dirty="0">
@@ -11785,7 +11929,21 @@
                 <a:latin typeface="Consolas" pitchFamily="49" charset="0"/>
                 <a:cs typeface="Consolas" pitchFamily="49" charset="0"/>
               </a:rPr>
-              <a:t>     (rest los)))]))</a:t>
+              <a:t>     (rest </a:t>
+            </a:r>
+            <a:r>
+              <a:rPr lang="en-US" sz="2400" b="1" dirty="0" err="1">
+                <a:latin typeface="Consolas" pitchFamily="49" charset="0"/>
+                <a:cs typeface="Consolas" pitchFamily="49" charset="0"/>
+              </a:rPr>
+              <a:t>lst</a:t>
+            </a:r>
+            <a:r>
+              <a:rPr lang="en-US" sz="2400" b="1" dirty="0">
+                <a:latin typeface="Consolas" pitchFamily="49" charset="0"/>
+                <a:cs typeface="Consolas" pitchFamily="49" charset="0"/>
+              </a:rPr>
+              <a:t>)))]))</a:t>
             </a:r>
           </a:p>
           <a:p>
@@ -11948,15 +12106,7 @@
             </a:pPr>
             <a:r>
               <a:rPr lang="en-US" sz="2400" dirty="0"/>
-              <a:t>;; STRATEGY: Use template for </a:t>
-            </a:r>
-            <a:r>
-              <a:rPr lang="en-US" sz="2400" dirty="0" err="1"/>
-              <a:t>ListOfX</a:t>
-            </a:r>
-            <a:r>
-              <a:rPr lang="en-US" sz="2400" dirty="0"/>
-              <a:t> on </a:t>
+              <a:t>;; STRATEGY: Use template for XList on </a:t>
             </a:r>
             <a:r>
               <a:rPr lang="en-US" sz="2400" dirty="0" err="1"/>
@@ -12163,25 +12313,20 @@
         </p:nvSpPr>
         <p:spPr>
           <a:xfrm>
-            <a:off x="3338384" y="5823639"/>
+            <a:off x="3200400" y="4994070"/>
             <a:ext cx="5410200" cy="830997"/>
           </a:xfrm>
           <a:prstGeom prst="rect">
             <a:avLst/>
           </a:prstGeom>
           <a:solidFill>
-            <a:schemeClr val="accent3">
+            <a:schemeClr val="accent1">
               <a:lumMod val="20000"/>
               <a:lumOff val="80000"/>
             </a:schemeClr>
           </a:solidFill>
           <a:ln w="12700">
-            <a:solidFill>
-              <a:schemeClr val="tx2">
-                <a:lumMod val="60000"/>
-                <a:lumOff val="40000"/>
-              </a:schemeClr>
-            </a:solidFill>
+            <a:noFill/>
           </a:ln>
         </p:spPr>
         <p:txBody>
@@ -12502,18 +12647,13 @@
             <a:avLst/>
           </a:prstGeom>
           <a:solidFill>
-            <a:schemeClr val="accent3">
+            <a:schemeClr val="accent1">
               <a:lumMod val="20000"/>
               <a:lumOff val="80000"/>
             </a:schemeClr>
           </a:solidFill>
           <a:ln w="12700">
-            <a:solidFill>
-              <a:schemeClr val="tx2">
-                <a:lumMod val="60000"/>
-                <a:lumOff val="40000"/>
-              </a:schemeClr>
-            </a:solidFill>
+            <a:noFill/>
           </a:ln>
         </p:spPr>
         <p:txBody>
@@ -12547,12 +12687,7 @@
             <a:srgbClr val="F1F892"/>
           </a:solidFill>
           <a:ln w="12700">
-            <a:solidFill>
-              <a:schemeClr val="tx2">
-                <a:lumMod val="60000"/>
-                <a:lumOff val="40000"/>
-              </a:schemeClr>
-            </a:solidFill>
+            <a:noFill/>
           </a:ln>
         </p:spPr>
         <p:txBody>

</xml_diff>